<commit_message>
cambios en presentacion IA
</commit_message>
<xml_diff>
--- a/Inteligencia Artificial/Proyecto final/Sistema de recomendación de celulares.pptx
+++ b/Inteligencia Artificial/Proyecto final/Sistema de recomendación de celulares.pptx
@@ -4684,11 +4684,7 @@
             </a:r>
             <a:r>
               <a:rPr lang="es-ES" dirty="0" smtClean="0"/>
-              <a:t> </a:t>
-            </a:r>
-            <a:r>
-              <a:rPr lang="es-ES" dirty="0" smtClean="0"/>
-              <a:t>John </a:t>
+              <a:t> John </a:t>
             </a:r>
             <a:r>
               <a:rPr lang="es-ES" dirty="0" err="1" smtClean="0"/>
@@ -4832,6 +4828,47 @@
           <a:prstGeom prst="rect">
             <a:avLst/>
           </a:prstGeom>
+        </p:spPr>
+      </p:pic>
+      <p:pic>
+        <p:nvPicPr>
+          <p:cNvPr id="1026" name="Picture 2" descr="http://www.mundonets.com/images/programas/netbeans.jpg"/>
+          <p:cNvPicPr>
+            <a:picLocks noChangeAspect="1" noChangeArrowheads="1"/>
+          </p:cNvPicPr>
+          <p:nvPr/>
+        </p:nvPicPr>
+        <p:blipFill>
+          <a:blip r:embed="rId4">
+            <a:extLst>
+              <a:ext uri="{28A0092B-C50C-407E-A947-70E740481C1C}">
+                <a14:useLocalDpi xmlns:a14="http://schemas.microsoft.com/office/drawing/2010/main" val="0"/>
+              </a:ext>
+            </a:extLst>
+          </a:blip>
+          <a:srcRect/>
+          <a:stretch>
+            <a:fillRect/>
+          </a:stretch>
+        </p:blipFill>
+        <p:spPr bwMode="auto">
+          <a:xfrm>
+            <a:off x="4217212" y="3126820"/>
+            <a:ext cx="2857500" cy="1571626"/>
+          </a:xfrm>
+          <a:prstGeom prst="rect">
+            <a:avLst/>
+          </a:prstGeom>
+          <a:noFill/>
+          <a:extLst>
+            <a:ext uri="{909E8E84-426E-40DD-AFC4-6F175D3DCCD1}">
+              <a14:hiddenFill xmlns:a14="http://schemas.microsoft.com/office/drawing/2010/main">
+                <a:solidFill>
+                  <a:srgbClr val="FFFFFF"/>
+                </a:solidFill>
+              </a14:hiddenFill>
+            </a:ext>
+          </a:extLst>
         </p:spPr>
       </p:pic>
     </p:spTree>

</xml_diff>